<commit_message>
Final commit. Fixed lots of errors based on feedback from Alberto.
</commit_message>
<xml_diff>
--- a/figures/network_packet.pptx
+++ b/figures/network_packet.pptx
@@ -116,13 +116,245 @@
 <file path=ppt/revisionInfo.xml><?xml version="1.0" encoding="utf-8"?>
 <p1510:revInfo xmlns:a="http://schemas.openxmlformats.org/drawingml/2006/main" xmlns:r="http://schemas.openxmlformats.org/officeDocument/2006/relationships" xmlns:p1510="http://schemas.microsoft.com/office/powerpoint/2015/10/main">
   <p1510:revLst>
-    <p1510:client id="{8996B927-3913-447F-9B0F-439498A4C286}" v="34" dt="2022-02-02T15:28:14.640"/>
+    <p1510:client id="{186147AE-27E4-42C9-A50B-4D9999DC42A8}" v="8" dt="2022-05-04T15:32:06.164"/>
   </p1510:revLst>
 </p1510:revInfo>
 </file>
 
 <file path=ppt/changesInfos/changesInfo1.xml><?xml version="1.0" encoding="utf-8"?>
 <pc:chgInfo xmlns:a="http://schemas.openxmlformats.org/drawingml/2006/main" xmlns:r="http://schemas.openxmlformats.org/officeDocument/2006/relationships" xmlns:ac="http://schemas.microsoft.com/office/drawing/2013/main/command" xmlns:pc="http://schemas.microsoft.com/office/powerpoint/2013/main/command">
+  <pc:docChgLst>
+    <pc:chgData name="Lucas Bürgi" userId="a8f41495390befef" providerId="LiveId" clId="{186147AE-27E4-42C9-A50B-4D9999DC42A8}"/>
+    <pc:docChg chg="undo redo custSel modSld">
+      <pc:chgData name="Lucas Bürgi" userId="a8f41495390befef" providerId="LiveId" clId="{186147AE-27E4-42C9-A50B-4D9999DC42A8}" dt="2022-05-04T16:04:47.579" v="262" actId="20577"/>
+      <pc:docMkLst>
+        <pc:docMk/>
+      </pc:docMkLst>
+      <pc:sldChg chg="addSp delSp modSp mod">
+        <pc:chgData name="Lucas Bürgi" userId="a8f41495390befef" providerId="LiveId" clId="{186147AE-27E4-42C9-A50B-4D9999DC42A8}" dt="2022-05-04T16:04:47.579" v="262" actId="20577"/>
+        <pc:sldMkLst>
+          <pc:docMk/>
+          <pc:sldMk cId="1790720050" sldId="257"/>
+        </pc:sldMkLst>
+        <pc:spChg chg="add del mod">
+          <ac:chgData name="Lucas Bürgi" userId="a8f41495390befef" providerId="LiveId" clId="{186147AE-27E4-42C9-A50B-4D9999DC42A8}" dt="2022-05-04T15:32:07.998" v="250" actId="478"/>
+          <ac:spMkLst>
+            <pc:docMk/>
+            <pc:sldMk cId="1790720050" sldId="257"/>
+            <ac:spMk id="2" creationId="{EEA7B90C-8377-4097-8E1C-9F824F194D06}"/>
+          </ac:spMkLst>
+        </pc:spChg>
+        <pc:spChg chg="mod">
+          <ac:chgData name="Lucas Bürgi" userId="a8f41495390befef" providerId="LiveId" clId="{186147AE-27E4-42C9-A50B-4D9999DC42A8}" dt="2022-05-04T15:32:20.915" v="252" actId="20577"/>
+          <ac:spMkLst>
+            <pc:docMk/>
+            <pc:sldMk cId="1790720050" sldId="257"/>
+            <ac:spMk id="9" creationId="{A19EC877-982F-406D-8F1B-DA5D629DFED5}"/>
+          </ac:spMkLst>
+        </pc:spChg>
+        <pc:spChg chg="mod">
+          <ac:chgData name="Lucas Bürgi" userId="a8f41495390befef" providerId="LiveId" clId="{186147AE-27E4-42C9-A50B-4D9999DC42A8}" dt="2022-05-04T15:17:14.716" v="11" actId="1076"/>
+          <ac:spMkLst>
+            <pc:docMk/>
+            <pc:sldMk cId="1790720050" sldId="257"/>
+            <ac:spMk id="10" creationId="{845A37D3-68E1-46D0-B6BC-C2FA786E4A43}"/>
+          </ac:spMkLst>
+        </pc:spChg>
+        <pc:spChg chg="add del">
+          <ac:chgData name="Lucas Bürgi" userId="a8f41495390befef" providerId="LiveId" clId="{186147AE-27E4-42C9-A50B-4D9999DC42A8}" dt="2022-05-04T15:20:27.381" v="56" actId="478"/>
+          <ac:spMkLst>
+            <pc:docMk/>
+            <pc:sldMk cId="1790720050" sldId="257"/>
+            <ac:spMk id="26" creationId="{9E802C41-2B94-2FB6-5E17-EB537F17F817}"/>
+          </ac:spMkLst>
+        </pc:spChg>
+        <pc:spChg chg="add del">
+          <ac:chgData name="Lucas Bürgi" userId="a8f41495390befef" providerId="LiveId" clId="{186147AE-27E4-42C9-A50B-4D9999DC42A8}" dt="2022-05-04T15:20:49.057" v="59" actId="478"/>
+          <ac:spMkLst>
+            <pc:docMk/>
+            <pc:sldMk cId="1790720050" sldId="257"/>
+            <ac:spMk id="27" creationId="{15F419B2-B296-B26D-F5BB-F7BFFB12499D}"/>
+          </ac:spMkLst>
+        </pc:spChg>
+        <pc:spChg chg="add del">
+          <ac:chgData name="Lucas Bürgi" userId="a8f41495390befef" providerId="LiveId" clId="{186147AE-27E4-42C9-A50B-4D9999DC42A8}" dt="2022-05-04T15:21:03.202" v="61" actId="478"/>
+          <ac:spMkLst>
+            <pc:docMk/>
+            <pc:sldMk cId="1790720050" sldId="257"/>
+            <ac:spMk id="28" creationId="{C01DE488-E751-59E9-7EC3-5957A78F8BC0}"/>
+          </ac:spMkLst>
+        </pc:spChg>
+        <pc:spChg chg="del mod">
+          <ac:chgData name="Lucas Bürgi" userId="a8f41495390befef" providerId="LiveId" clId="{186147AE-27E4-42C9-A50B-4D9999DC42A8}" dt="2022-05-04T15:18:46.721" v="39" actId="478"/>
+          <ac:spMkLst>
+            <pc:docMk/>
+            <pc:sldMk cId="1790720050" sldId="257"/>
+            <ac:spMk id="29" creationId="{9265AEEF-4006-4205-BB20-5D0C05B8BAE9}"/>
+          </ac:spMkLst>
+        </pc:spChg>
+        <pc:spChg chg="del mod">
+          <ac:chgData name="Lucas Bürgi" userId="a8f41495390befef" providerId="LiveId" clId="{186147AE-27E4-42C9-A50B-4D9999DC42A8}" dt="2022-05-04T15:27:43.104" v="177" actId="478"/>
+          <ac:spMkLst>
+            <pc:docMk/>
+            <pc:sldMk cId="1790720050" sldId="257"/>
+            <ac:spMk id="30" creationId="{6F98BFCF-7527-43B0-87D2-E3886DEBF82A}"/>
+          </ac:spMkLst>
+        </pc:spChg>
+        <pc:spChg chg="mod">
+          <ac:chgData name="Lucas Bürgi" userId="a8f41495390befef" providerId="LiveId" clId="{186147AE-27E4-42C9-A50B-4D9999DC42A8}" dt="2022-05-04T15:24:54.692" v="100" actId="1076"/>
+          <ac:spMkLst>
+            <pc:docMk/>
+            <pc:sldMk cId="1790720050" sldId="257"/>
+            <ac:spMk id="31" creationId="{1807DA9C-5862-46BA-8C1B-F481C840516C}"/>
+          </ac:spMkLst>
+        </pc:spChg>
+        <pc:spChg chg="mod">
+          <ac:chgData name="Lucas Bürgi" userId="a8f41495390befef" providerId="LiveId" clId="{186147AE-27E4-42C9-A50B-4D9999DC42A8}" dt="2022-05-04T15:32:39.062" v="254" actId="1076"/>
+          <ac:spMkLst>
+            <pc:docMk/>
+            <pc:sldMk cId="1790720050" sldId="257"/>
+            <ac:spMk id="32" creationId="{C33F01CC-7B82-45EF-BC68-8AA9ABF6548D}"/>
+          </ac:spMkLst>
+        </pc:spChg>
+        <pc:spChg chg="add del mod">
+          <ac:chgData name="Lucas Bürgi" userId="a8f41495390befef" providerId="LiveId" clId="{186147AE-27E4-42C9-A50B-4D9999DC42A8}" dt="2022-05-04T15:21:35.614" v="67" actId="478"/>
+          <ac:spMkLst>
+            <pc:docMk/>
+            <pc:sldMk cId="1790720050" sldId="257"/>
+            <ac:spMk id="33" creationId="{A12061F6-36FE-78E0-9693-D8499A874E65}"/>
+          </ac:spMkLst>
+        </pc:spChg>
+        <pc:spChg chg="add del mod">
+          <ac:chgData name="Lucas Bürgi" userId="a8f41495390befef" providerId="LiveId" clId="{186147AE-27E4-42C9-A50B-4D9999DC42A8}" dt="2022-05-04T15:28:12.283" v="182" actId="478"/>
+          <ac:spMkLst>
+            <pc:docMk/>
+            <pc:sldMk cId="1790720050" sldId="257"/>
+            <ac:spMk id="48" creationId="{997CFBA6-A120-DF45-7949-64F7488A81A7}"/>
+          </ac:spMkLst>
+        </pc:spChg>
+        <pc:spChg chg="add del mod">
+          <ac:chgData name="Lucas Bürgi" userId="a8f41495390befef" providerId="LiveId" clId="{186147AE-27E4-42C9-A50B-4D9999DC42A8}" dt="2022-05-04T15:27:04.803" v="170"/>
+          <ac:spMkLst>
+            <pc:docMk/>
+            <pc:sldMk cId="1790720050" sldId="257"/>
+            <ac:spMk id="51" creationId="{0FC9D4DC-D016-5949-EB52-3EE8BA1796B1}"/>
+          </ac:spMkLst>
+        </pc:spChg>
+        <pc:spChg chg="add mod">
+          <ac:chgData name="Lucas Bürgi" userId="a8f41495390befef" providerId="LiveId" clId="{186147AE-27E4-42C9-A50B-4D9999DC42A8}" dt="2022-05-04T16:04:47.579" v="262" actId="20577"/>
+          <ac:spMkLst>
+            <pc:docMk/>
+            <pc:sldMk cId="1790720050" sldId="257"/>
+            <ac:spMk id="52" creationId="{5BEC004A-DF06-51BE-D2BD-85A4DCEB5617}"/>
+          </ac:spMkLst>
+        </pc:spChg>
+        <pc:spChg chg="add del mod">
+          <ac:chgData name="Lucas Bürgi" userId="a8f41495390befef" providerId="LiveId" clId="{186147AE-27E4-42C9-A50B-4D9999DC42A8}" dt="2022-05-04T15:28:10.472" v="181" actId="478"/>
+          <ac:spMkLst>
+            <pc:docMk/>
+            <pc:sldMk cId="1790720050" sldId="257"/>
+            <ac:spMk id="53" creationId="{84B75330-6EE8-BACD-F0DF-5871F24B444D}"/>
+          </ac:spMkLst>
+        </pc:spChg>
+        <pc:spChg chg="add del mod">
+          <ac:chgData name="Lucas Bürgi" userId="a8f41495390befef" providerId="LiveId" clId="{186147AE-27E4-42C9-A50B-4D9999DC42A8}" dt="2022-05-04T15:32:06.164" v="248" actId="767"/>
+          <ac:spMkLst>
+            <pc:docMk/>
+            <pc:sldMk cId="1790720050" sldId="257"/>
+            <ac:spMk id="60" creationId="{19888CF1-F180-D238-A0AB-F4C4E07AC9B0}"/>
+          </ac:spMkLst>
+        </pc:spChg>
+        <pc:picChg chg="mod">
+          <ac:chgData name="Lucas Bürgi" userId="a8f41495390befef" providerId="LiveId" clId="{186147AE-27E4-42C9-A50B-4D9999DC42A8}" dt="2022-05-04T15:17:14.716" v="11" actId="1076"/>
+          <ac:picMkLst>
+            <pc:docMk/>
+            <pc:sldMk cId="1790720050" sldId="257"/>
+            <ac:picMk id="4" creationId="{9F0634A8-347C-41AD-A3A1-5ED131C309B2}"/>
+          </ac:picMkLst>
+        </pc:picChg>
+        <pc:picChg chg="mod">
+          <ac:chgData name="Lucas Bürgi" userId="a8f41495390befef" providerId="LiveId" clId="{186147AE-27E4-42C9-A50B-4D9999DC42A8}" dt="2022-05-04T15:25:28.432" v="105" actId="1076"/>
+          <ac:picMkLst>
+            <pc:docMk/>
+            <pc:sldMk cId="1790720050" sldId="257"/>
+            <ac:picMk id="6" creationId="{63CB0A34-8ADE-4E5B-9609-F4B46E0C120E}"/>
+          </ac:picMkLst>
+        </pc:picChg>
+        <pc:picChg chg="add mod">
+          <ac:chgData name="Lucas Bürgi" userId="a8f41495390befef" providerId="LiveId" clId="{186147AE-27E4-42C9-A50B-4D9999DC42A8}" dt="2022-05-04T15:32:45.274" v="255" actId="1076"/>
+          <ac:picMkLst>
+            <pc:docMk/>
+            <pc:sldMk cId="1790720050" sldId="257"/>
+            <ac:picMk id="50" creationId="{2826B35E-549F-9070-B1A5-13B7E9D54BDB}"/>
+          </ac:picMkLst>
+        </pc:picChg>
+        <pc:cxnChg chg="add del mod">
+          <ac:chgData name="Lucas Bürgi" userId="a8f41495390befef" providerId="LiveId" clId="{186147AE-27E4-42C9-A50B-4D9999DC42A8}" dt="2022-05-04T15:17:27.754" v="13" actId="478"/>
+          <ac:cxnSpMkLst>
+            <pc:docMk/>
+            <pc:sldMk cId="1790720050" sldId="257"/>
+            <ac:cxnSpMk id="5" creationId="{A88DDCD9-9B91-EAB9-1B25-B20D26227E9E}"/>
+          </ac:cxnSpMkLst>
+        </pc:cxnChg>
+        <pc:cxnChg chg="add mod">
+          <ac:chgData name="Lucas Bürgi" userId="a8f41495390befef" providerId="LiveId" clId="{186147AE-27E4-42C9-A50B-4D9999DC42A8}" dt="2022-05-04T15:28:05.480" v="180" actId="692"/>
+          <ac:cxnSpMkLst>
+            <pc:docMk/>
+            <pc:sldMk cId="1790720050" sldId="257"/>
+            <ac:cxnSpMk id="8" creationId="{B589D56C-AE78-0355-3A8A-B37FB35F3A2E}"/>
+          </ac:cxnSpMkLst>
+        </pc:cxnChg>
+        <pc:cxnChg chg="add del mod">
+          <ac:chgData name="Lucas Bürgi" userId="a8f41495390befef" providerId="LiveId" clId="{186147AE-27E4-42C9-A50B-4D9999DC42A8}" dt="2022-05-04T15:22:24.242" v="75" actId="478"/>
+          <ac:cxnSpMkLst>
+            <pc:docMk/>
+            <pc:sldMk cId="1790720050" sldId="257"/>
+            <ac:cxnSpMk id="18" creationId="{129A281B-1756-43D6-011F-3BB1A07936A7}"/>
+          </ac:cxnSpMkLst>
+        </pc:cxnChg>
+        <pc:cxnChg chg="add del">
+          <ac:chgData name="Lucas Bürgi" userId="a8f41495390befef" providerId="LiveId" clId="{186147AE-27E4-42C9-A50B-4D9999DC42A8}" dt="2022-05-04T15:23:13.104" v="82" actId="11529"/>
+          <ac:cxnSpMkLst>
+            <pc:docMk/>
+            <pc:sldMk cId="1790720050" sldId="257"/>
+            <ac:cxnSpMk id="35" creationId="{B5311373-1BF6-AB19-63FA-95D2F722887D}"/>
+          </ac:cxnSpMkLst>
+        </pc:cxnChg>
+        <pc:cxnChg chg="add del mod">
+          <ac:chgData name="Lucas Bürgi" userId="a8f41495390befef" providerId="LiveId" clId="{186147AE-27E4-42C9-A50B-4D9999DC42A8}" dt="2022-05-04T15:24:03.560" v="93" actId="478"/>
+          <ac:cxnSpMkLst>
+            <pc:docMk/>
+            <pc:sldMk cId="1790720050" sldId="257"/>
+            <ac:cxnSpMk id="37" creationId="{64F5F837-8088-66A9-D5B4-D8D6FCF8A74D}"/>
+          </ac:cxnSpMkLst>
+        </pc:cxnChg>
+        <pc:cxnChg chg="add del mod">
+          <ac:chgData name="Lucas Bürgi" userId="a8f41495390befef" providerId="LiveId" clId="{186147AE-27E4-42C9-A50B-4D9999DC42A8}" dt="2022-05-04T15:24:35.226" v="95" actId="478"/>
+          <ac:cxnSpMkLst>
+            <pc:docMk/>
+            <pc:sldMk cId="1790720050" sldId="257"/>
+            <ac:cxnSpMk id="47" creationId="{0D5A04ED-1EBF-310F-7DDC-56F3F8ACA73C}"/>
+          </ac:cxnSpMkLst>
+        </pc:cxnChg>
+        <pc:cxnChg chg="add del mod">
+          <ac:chgData name="Lucas Bürgi" userId="a8f41495390befef" providerId="LiveId" clId="{186147AE-27E4-42C9-A50B-4D9999DC42A8}" dt="2022-05-04T15:32:05.831" v="247" actId="14100"/>
+          <ac:cxnSpMkLst>
+            <pc:docMk/>
+            <pc:sldMk cId="1790720050" sldId="257"/>
+            <ac:cxnSpMk id="55" creationId="{8DC11FCF-D27A-C04C-66D4-1E58D74A6C6A}"/>
+          </ac:cxnSpMkLst>
+        </pc:cxnChg>
+        <pc:cxnChg chg="add del mod">
+          <ac:chgData name="Lucas Bürgi" userId="a8f41495390befef" providerId="LiveId" clId="{186147AE-27E4-42C9-A50B-4D9999DC42A8}" dt="2022-05-04T15:32:01.864" v="239" actId="11529"/>
+          <ac:cxnSpMkLst>
+            <pc:docMk/>
+            <pc:sldMk cId="1790720050" sldId="257"/>
+            <ac:cxnSpMk id="70" creationId="{3AACE0FE-8E4E-5881-1D93-0CE9AC7EB58D}"/>
+          </ac:cxnSpMkLst>
+        </pc:cxnChg>
+      </pc:sldChg>
+    </pc:docChg>
+  </pc:docChgLst>
   <pc:docChgLst>
     <pc:chgData name="Lucas Bürgi" userId="a8f41495390befef" providerId="LiveId" clId="{8996B927-3913-447F-9B0F-439498A4C286}"/>
     <pc:docChg chg="undo custSel addSld modSld">
@@ -394,7 +626,7 @@
           <a:p>
             <a:fld id="{2DB01E65-CCAF-44F9-BC72-7989687BB0AA}" type="datetimeFigureOut">
               <a:rPr lang="en-GB" smtClean="0"/>
-              <a:t>02/02/2022</a:t>
+              <a:t>04/05/2022</a:t>
             </a:fld>
             <a:endParaRPr lang="en-GB"/>
           </a:p>
@@ -594,7 +826,7 @@
           <a:p>
             <a:fld id="{2DB01E65-CCAF-44F9-BC72-7989687BB0AA}" type="datetimeFigureOut">
               <a:rPr lang="en-GB" smtClean="0"/>
-              <a:t>02/02/2022</a:t>
+              <a:t>04/05/2022</a:t>
             </a:fld>
             <a:endParaRPr lang="en-GB"/>
           </a:p>
@@ -804,7 +1036,7 @@
           <a:p>
             <a:fld id="{2DB01E65-CCAF-44F9-BC72-7989687BB0AA}" type="datetimeFigureOut">
               <a:rPr lang="en-GB" smtClean="0"/>
-              <a:t>02/02/2022</a:t>
+              <a:t>04/05/2022</a:t>
             </a:fld>
             <a:endParaRPr lang="en-GB"/>
           </a:p>
@@ -1004,7 +1236,7 @@
           <a:p>
             <a:fld id="{2DB01E65-CCAF-44F9-BC72-7989687BB0AA}" type="datetimeFigureOut">
               <a:rPr lang="en-GB" smtClean="0"/>
-              <a:t>02/02/2022</a:t>
+              <a:t>04/05/2022</a:t>
             </a:fld>
             <a:endParaRPr lang="en-GB"/>
           </a:p>
@@ -1280,7 +1512,7 @@
           <a:p>
             <a:fld id="{2DB01E65-CCAF-44F9-BC72-7989687BB0AA}" type="datetimeFigureOut">
               <a:rPr lang="en-GB" smtClean="0"/>
-              <a:t>02/02/2022</a:t>
+              <a:t>04/05/2022</a:t>
             </a:fld>
             <a:endParaRPr lang="en-GB"/>
           </a:p>
@@ -1548,7 +1780,7 @@
           <a:p>
             <a:fld id="{2DB01E65-CCAF-44F9-BC72-7989687BB0AA}" type="datetimeFigureOut">
               <a:rPr lang="en-GB" smtClean="0"/>
-              <a:t>02/02/2022</a:t>
+              <a:t>04/05/2022</a:t>
             </a:fld>
             <a:endParaRPr lang="en-GB"/>
           </a:p>
@@ -1963,7 +2195,7 @@
           <a:p>
             <a:fld id="{2DB01E65-CCAF-44F9-BC72-7989687BB0AA}" type="datetimeFigureOut">
               <a:rPr lang="en-GB" smtClean="0"/>
-              <a:t>02/02/2022</a:t>
+              <a:t>04/05/2022</a:t>
             </a:fld>
             <a:endParaRPr lang="en-GB"/>
           </a:p>
@@ -2105,7 +2337,7 @@
           <a:p>
             <a:fld id="{2DB01E65-CCAF-44F9-BC72-7989687BB0AA}" type="datetimeFigureOut">
               <a:rPr lang="en-GB" smtClean="0"/>
-              <a:t>02/02/2022</a:t>
+              <a:t>04/05/2022</a:t>
             </a:fld>
             <a:endParaRPr lang="en-GB"/>
           </a:p>
@@ -2218,7 +2450,7 @@
           <a:p>
             <a:fld id="{2DB01E65-CCAF-44F9-BC72-7989687BB0AA}" type="datetimeFigureOut">
               <a:rPr lang="en-GB" smtClean="0"/>
-              <a:t>02/02/2022</a:t>
+              <a:t>04/05/2022</a:t>
             </a:fld>
             <a:endParaRPr lang="en-GB"/>
           </a:p>
@@ -2531,7 +2763,7 @@
           <a:p>
             <a:fld id="{2DB01E65-CCAF-44F9-BC72-7989687BB0AA}" type="datetimeFigureOut">
               <a:rPr lang="en-GB" smtClean="0"/>
-              <a:t>02/02/2022</a:t>
+              <a:t>04/05/2022</a:t>
             </a:fld>
             <a:endParaRPr lang="en-GB"/>
           </a:p>
@@ -2820,7 +3052,7 @@
           <a:p>
             <a:fld id="{2DB01E65-CCAF-44F9-BC72-7989687BB0AA}" type="datetimeFigureOut">
               <a:rPr lang="en-GB" smtClean="0"/>
-              <a:t>02/02/2022</a:t>
+              <a:t>04/05/2022</a:t>
             </a:fld>
             <a:endParaRPr lang="en-GB"/>
           </a:p>
@@ -3063,7 +3295,7 @@
           <a:p>
             <a:fld id="{2DB01E65-CCAF-44F9-BC72-7989687BB0AA}" type="datetimeFigureOut">
               <a:rPr lang="en-GB" smtClean="0"/>
-              <a:t>02/02/2022</a:t>
+              <a:t>04/05/2022</a:t>
             </a:fld>
             <a:endParaRPr lang="en-GB"/>
           </a:p>
@@ -3579,7 +3811,7 @@
         </p:blipFill>
         <p:spPr>
           <a:xfrm>
-            <a:off x="8720921" y="2742715"/>
+            <a:off x="4628611" y="2465082"/>
             <a:ext cx="1232736" cy="1232736"/>
           </a:xfrm>
           <a:custGeom>
@@ -3662,8 +3894,8 @@
         </p:blipFill>
         <p:spPr>
           <a:xfrm>
-            <a:off x="2038411" y="2742715"/>
-            <a:ext cx="1372570" cy="1372570"/>
+            <a:off x="641847" y="1873298"/>
+            <a:ext cx="1232736" cy="1232736"/>
           </a:xfrm>
           <a:custGeom>
             <a:avLst/>
@@ -3728,7 +3960,7 @@
         </p:nvSpPr>
         <p:spPr>
           <a:xfrm>
-            <a:off x="2107314" y="2558049"/>
+            <a:off x="635912" y="1665583"/>
             <a:ext cx="1234764" cy="369332"/>
           </a:xfrm>
           <a:prstGeom prst="rect">
@@ -3745,7 +3977,7 @@
             <a:pPr algn="ctr"/>
             <a:r>
               <a:rPr lang="en-GB" dirty="0"/>
-              <a:t>Host 1</a:t>
+              <a:t>Host</a:t>
             </a:r>
           </a:p>
         </p:txBody>
@@ -3764,7 +3996,7 @@
         </p:nvSpPr>
         <p:spPr>
           <a:xfrm>
-            <a:off x="8205718" y="2536534"/>
+            <a:off x="4113408" y="2258901"/>
             <a:ext cx="2263142" cy="369332"/>
           </a:xfrm>
           <a:prstGeom prst="rect">
@@ -3788,63 +4020,106 @@
       </p:sp>
       <p:sp>
         <p:nvSpPr>
-          <p:cNvPr id="29" name="Freihandform: Form 28">
-            <a:extLst>
-              <a:ext uri="{FF2B5EF4-FFF2-40B4-BE49-F238E27FC236}">
-                <a16:creationId xmlns:a16="http://schemas.microsoft.com/office/drawing/2014/main" id="{9265AEEF-4006-4205-BB20-5D0C05B8BAE9}"/>
-              </a:ext>
-            </a:extLst>
-          </p:cNvPr>
-          <p:cNvSpPr/>
+          <p:cNvPr id="31" name="Textfeld 30">
+            <a:extLst>
+              <a:ext uri="{FF2B5EF4-FFF2-40B4-BE49-F238E27FC236}">
+                <a16:creationId xmlns:a16="http://schemas.microsoft.com/office/drawing/2014/main" id="{1807DA9C-5862-46BA-8C1B-F481C840516C}"/>
+              </a:ext>
+            </a:extLst>
+          </p:cNvPr>
+          <p:cNvSpPr txBox="1"/>
           <p:nvPr/>
         </p:nvSpPr>
         <p:spPr>
           <a:xfrm>
-            <a:off x="2973386" y="915867"/>
-            <a:ext cx="6242180" cy="1566150"/>
+            <a:off x="2159786" y="804412"/>
+            <a:ext cx="2178699" cy="307777"/>
           </a:xfrm>
-          <a:custGeom>
+          <a:prstGeom prst="rect">
             <a:avLst/>
-            <a:gdLst>
-              <a:gd name="connsiteX0" fmla="*/ 0 w 6643396"/>
-              <a:gd name="connsiteY0" fmla="*/ 1549456 h 1698745"/>
-              <a:gd name="connsiteX1" fmla="*/ 2696547 w 6643396"/>
-              <a:gd name="connsiteY1" fmla="*/ 574 h 1698745"/>
-              <a:gd name="connsiteX2" fmla="*/ 6643396 w 6643396"/>
-              <a:gd name="connsiteY2" fmla="*/ 1698745 h 1698745"/>
-            </a:gdLst>
-            <a:ahLst/>
-            <a:cxnLst>
-              <a:cxn ang="0">
-                <a:pos x="connsiteX0" y="connsiteY0"/>
-              </a:cxn>
-              <a:cxn ang="0">
-                <a:pos x="connsiteX1" y="connsiteY1"/>
-              </a:cxn>
-              <a:cxn ang="0">
-                <a:pos x="connsiteX2" y="connsiteY2"/>
-              </a:cxn>
-            </a:cxnLst>
-            <a:rect l="l" t="t" r="r" b="b"/>
-            <a:pathLst>
-              <a:path w="6643396" h="1698745">
-                <a:moveTo>
-                  <a:pt x="0" y="1549456"/>
-                </a:moveTo>
-                <a:cubicBezTo>
-                  <a:pt x="794657" y="762574"/>
-                  <a:pt x="1589314" y="-24307"/>
-                  <a:pt x="2696547" y="574"/>
-                </a:cubicBezTo>
-                <a:cubicBezTo>
-                  <a:pt x="3803780" y="25455"/>
-                  <a:pt x="5996473" y="1474810"/>
-                  <a:pt x="6643396" y="1698745"/>
-                </a:cubicBezTo>
-              </a:path>
-            </a:pathLst>
-          </a:custGeom>
+          </a:prstGeom>
           <a:noFill/>
+        </p:spPr>
+        <p:txBody>
+          <a:bodyPr wrap="square" rtlCol="0">
+            <a:spAutoFit/>
+          </a:bodyPr>
+          <a:lstStyle/>
+          <a:p>
+            <a:pPr algn="ctr"/>
+            <a:r>
+              <a:rPr lang="en-GB" sz="1400" i="1" dirty="0">
+                <a:latin typeface="Calibri (Textkörper)"/>
+                <a:cs typeface="Times New Roman" panose="02020603050405020304" pitchFamily="18" charset="0"/>
+              </a:rPr>
+              <a:t>Lookup packet (Lookup key)</a:t>
+            </a:r>
+          </a:p>
+        </p:txBody>
+      </p:sp>
+      <p:sp>
+        <p:nvSpPr>
+          <p:cNvPr id="32" name="Textfeld 31">
+            <a:extLst>
+              <a:ext uri="{FF2B5EF4-FFF2-40B4-BE49-F238E27FC236}">
+                <a16:creationId xmlns:a16="http://schemas.microsoft.com/office/drawing/2014/main" id="{C33F01CC-7B82-45EF-BC68-8AA9ABF6548D}"/>
+              </a:ext>
+            </a:extLst>
+          </p:cNvPr>
+          <p:cNvSpPr txBox="1"/>
+          <p:nvPr/>
+        </p:nvSpPr>
+        <p:spPr>
+          <a:xfrm>
+            <a:off x="6717383" y="5763599"/>
+            <a:ext cx="2809794" cy="523220"/>
+          </a:xfrm>
+          <a:prstGeom prst="rect">
+            <a:avLst/>
+          </a:prstGeom>
+          <a:noFill/>
+        </p:spPr>
+        <p:txBody>
+          <a:bodyPr wrap="square" rtlCol="0">
+            <a:spAutoFit/>
+          </a:bodyPr>
+          <a:lstStyle/>
+          <a:p>
+            <a:pPr algn="ctr"/>
+            <a:r>
+              <a:rPr lang="en-GB" sz="1400" i="1" dirty="0">
+                <a:latin typeface="Calibri (Textkörper)"/>
+                <a:cs typeface="Times New Roman" panose="02020603050405020304" pitchFamily="18" charset="0"/>
+              </a:rPr>
+              <a:t>Response (Estimated position and calculated error)</a:t>
+            </a:r>
+          </a:p>
+        </p:txBody>
+      </p:sp>
+      <p:cxnSp>
+        <p:nvCxnSpPr>
+          <p:cNvPr id="8" name="Verbinder: gekrümmt 7">
+            <a:extLst>
+              <a:ext uri="{FF2B5EF4-FFF2-40B4-BE49-F238E27FC236}">
+                <a16:creationId xmlns:a16="http://schemas.microsoft.com/office/drawing/2014/main" id="{B589D56C-AE78-0355-3A8A-B37FB35F3A2E}"/>
+              </a:ext>
+            </a:extLst>
+          </p:cNvPr>
+          <p:cNvCxnSpPr>
+            <a:cxnSpLocks/>
+          </p:cNvCxnSpPr>
+          <p:nvPr/>
+        </p:nvCxnSpPr>
+        <p:spPr>
+          <a:xfrm rot="16200000" flipH="1">
+            <a:off x="2957399" y="-124520"/>
+            <a:ext cx="593318" cy="3991685"/>
+          </a:xfrm>
+          <a:prstGeom prst="curvedConnector3">
+            <a:avLst>
+              <a:gd name="adj1" fmla="val -211517"/>
+            </a:avLst>
+          </a:prstGeom>
           <a:ln w="50800">
             <a:solidFill>
               <a:schemeClr val="accent2">
@@ -3853,8 +4128,153 @@
               </a:schemeClr>
             </a:solidFill>
             <a:prstDash val="dash"/>
+            <a:tailEnd type="stealth" w="lg" len="lg"/>
+          </a:ln>
+        </p:spPr>
+        <p:style>
+          <a:lnRef idx="1">
+            <a:schemeClr val="accent1"/>
+          </a:lnRef>
+          <a:fillRef idx="0">
+            <a:schemeClr val="accent1"/>
+          </a:fillRef>
+          <a:effectRef idx="0">
+            <a:schemeClr val="accent1"/>
+          </a:effectRef>
+          <a:fontRef idx="minor">
+            <a:schemeClr val="tx1"/>
+          </a:fontRef>
+        </p:style>
+      </p:cxnSp>
+      <p:pic>
+        <p:nvPicPr>
+          <p:cNvPr id="50" name="Grafik 49" descr="Server mit einfarbiger Füllung">
+            <a:extLst>
+              <a:ext uri="{FF2B5EF4-FFF2-40B4-BE49-F238E27FC236}">
+                <a16:creationId xmlns:a16="http://schemas.microsoft.com/office/drawing/2014/main" id="{2826B35E-549F-9070-B1A5-13B7E9D54BDB}"/>
+              </a:ext>
+            </a:extLst>
+          </p:cNvPr>
+          <p:cNvPicPr>
+            <a:picLocks noChangeAspect="1"/>
+          </p:cNvPicPr>
+          <p:nvPr/>
+        </p:nvPicPr>
+        <p:blipFill>
+          <a:blip r:embed="rId6">
+            <a:extLst>
+              <a:ext uri="{28A0092B-C50C-407E-A947-70E740481C1C}">
+                <a14:useLocalDpi xmlns:a14="http://schemas.microsoft.com/office/drawing/2010/main" val="0"/>
+              </a:ext>
+              <a:ext uri="{96DAC541-7B7A-43D3-8B79-37D633B846F1}">
+                <asvg:svgBlip xmlns:asvg="http://schemas.microsoft.com/office/drawing/2016/SVG/main" r:embed="rId7"/>
+              </a:ext>
+            </a:extLst>
+          </a:blip>
+          <a:stretch>
+            <a:fillRect/>
+          </a:stretch>
+        </p:blipFill>
+        <p:spPr>
+          <a:xfrm>
+            <a:off x="9826246" y="3827298"/>
+            <a:ext cx="1232736" cy="1232736"/>
+          </a:xfrm>
+          <a:prstGeom prst="rect">
+            <a:avLst/>
+          </a:prstGeom>
+        </p:spPr>
+      </p:pic>
+      <p:sp>
+        <p:nvSpPr>
+          <p:cNvPr id="52" name="Textfeld 51">
+            <a:extLst>
+              <a:ext uri="{FF2B5EF4-FFF2-40B4-BE49-F238E27FC236}">
+                <a16:creationId xmlns:a16="http://schemas.microsoft.com/office/drawing/2014/main" id="{5BEC004A-DF06-51BE-D2BD-85A4DCEB5617}"/>
+              </a:ext>
+            </a:extLst>
+          </p:cNvPr>
+          <p:cNvSpPr txBox="1"/>
+          <p:nvPr/>
+        </p:nvSpPr>
+        <p:spPr>
+          <a:xfrm>
+            <a:off x="8482033" y="3103108"/>
+            <a:ext cx="3921161" cy="861774"/>
+          </a:xfrm>
+          <a:prstGeom prst="rect">
+            <a:avLst/>
+          </a:prstGeom>
+          <a:noFill/>
+        </p:spPr>
+        <p:txBody>
+          <a:bodyPr wrap="square" rtlCol="0">
+            <a:spAutoFit/>
+          </a:bodyPr>
+          <a:lstStyle/>
+          <a:p>
+            <a:pPr algn="ctr"/>
+            <a:r>
+              <a:rPr lang="en-GB" dirty="0"/>
+              <a:t>Server</a:t>
+            </a:r>
+            <a:br>
+              <a:rPr lang="en-GB" dirty="0"/>
+            </a:br>
+            <a:r>
+              <a:rPr lang="en-GB" sz="1400" dirty="0"/>
+              <a:t>(</a:t>
+            </a:r>
+            <a:r>
+              <a:rPr lang="en-GB" sz="1400" i="1" dirty="0">
+                <a:latin typeface="Calibri (Textkörper)"/>
+                <a:cs typeface="Times New Roman" panose="02020603050405020304" pitchFamily="18" charset="0"/>
+              </a:rPr>
+              <a:t>performs search on narrowed response bound)</a:t>
+            </a:r>
+            <a:endParaRPr lang="en-GB" sz="1800" i="1" dirty="0">
+              <a:latin typeface="Calibri (Textkörper)"/>
+              <a:cs typeface="Times New Roman" panose="02020603050405020304" pitchFamily="18" charset="0"/>
+            </a:endParaRPr>
+          </a:p>
+          <a:p>
+            <a:pPr algn="ctr"/>
+            <a:endParaRPr lang="en-GB" dirty="0"/>
+          </a:p>
+        </p:txBody>
+      </p:sp>
+      <p:cxnSp>
+        <p:nvCxnSpPr>
+          <p:cNvPr id="55" name="Verbinder: gekrümmt 54">
+            <a:extLst>
+              <a:ext uri="{FF2B5EF4-FFF2-40B4-BE49-F238E27FC236}">
+                <a16:creationId xmlns:a16="http://schemas.microsoft.com/office/drawing/2014/main" id="{8DC11FCF-D27A-C04C-66D4-1E58D74A6C6A}"/>
+              </a:ext>
+            </a:extLst>
+          </p:cNvPr>
+          <p:cNvCxnSpPr>
+            <a:cxnSpLocks/>
+          </p:cNvCxnSpPr>
+          <p:nvPr/>
+        </p:nvCxnSpPr>
+        <p:spPr>
+          <a:xfrm rot="16200000" flipH="1">
+            <a:off x="7161237" y="1911041"/>
+            <a:ext cx="1365119" cy="5197634"/>
+          </a:xfrm>
+          <a:prstGeom prst="curvedConnector3">
+            <a:avLst>
+              <a:gd name="adj1" fmla="val 197126"/>
+            </a:avLst>
+          </a:prstGeom>
+          <a:noFill/>
+          <a:ln w="50800">
+            <a:solidFill>
+              <a:schemeClr val="accent5"/>
+            </a:solidFill>
+            <a:prstDash val="dash"/>
             <a:headEnd type="none" w="lg" len="med"/>
-            <a:tailEnd type="stealth" w="lg" len="med"/>
+            <a:tailEnd type="stealth" w="lg" len="lg"/>
           </a:ln>
         </p:spPr>
         <p:style>
@@ -3873,238 +4293,7 @@
             <a:schemeClr val="lt1"/>
           </a:fontRef>
         </p:style>
-        <p:txBody>
-          <a:bodyPr rtlCol="0" anchor="ctr"/>
-          <a:lstStyle/>
-          <a:p>
-            <a:pPr algn="ctr"/>
-            <a:endParaRPr lang="en-GB"/>
-          </a:p>
-        </p:txBody>
-      </p:sp>
-      <p:sp>
-        <p:nvSpPr>
-          <p:cNvPr id="30" name="Freihandform: Form 29">
-            <a:extLst>
-              <a:ext uri="{FF2B5EF4-FFF2-40B4-BE49-F238E27FC236}">
-                <a16:creationId xmlns:a16="http://schemas.microsoft.com/office/drawing/2014/main" id="{6F98BFCF-7527-43B0-87D2-E3886DEBF82A}"/>
-              </a:ext>
-            </a:extLst>
-          </p:cNvPr>
-          <p:cNvSpPr/>
-          <p:nvPr/>
-        </p:nvSpPr>
-        <p:spPr>
-          <a:xfrm flipV="1">
-            <a:off x="2999149" y="4029968"/>
-            <a:ext cx="6242180" cy="1566151"/>
-          </a:xfrm>
-          <a:custGeom>
-            <a:avLst/>
-            <a:gdLst>
-              <a:gd name="connsiteX0" fmla="*/ 0 w 6643396"/>
-              <a:gd name="connsiteY0" fmla="*/ 1549456 h 1698745"/>
-              <a:gd name="connsiteX1" fmla="*/ 2696547 w 6643396"/>
-              <a:gd name="connsiteY1" fmla="*/ 574 h 1698745"/>
-              <a:gd name="connsiteX2" fmla="*/ 6643396 w 6643396"/>
-              <a:gd name="connsiteY2" fmla="*/ 1698745 h 1698745"/>
-            </a:gdLst>
-            <a:ahLst/>
-            <a:cxnLst>
-              <a:cxn ang="0">
-                <a:pos x="connsiteX0" y="connsiteY0"/>
-              </a:cxn>
-              <a:cxn ang="0">
-                <a:pos x="connsiteX1" y="connsiteY1"/>
-              </a:cxn>
-              <a:cxn ang="0">
-                <a:pos x="connsiteX2" y="connsiteY2"/>
-              </a:cxn>
-            </a:cxnLst>
-            <a:rect l="l" t="t" r="r" b="b"/>
-            <a:pathLst>
-              <a:path w="6643396" h="1698745">
-                <a:moveTo>
-                  <a:pt x="0" y="1549456"/>
-                </a:moveTo>
-                <a:cubicBezTo>
-                  <a:pt x="794657" y="762574"/>
-                  <a:pt x="1589314" y="-24307"/>
-                  <a:pt x="2696547" y="574"/>
-                </a:cubicBezTo>
-                <a:cubicBezTo>
-                  <a:pt x="3803780" y="25455"/>
-                  <a:pt x="5996473" y="1474810"/>
-                  <a:pt x="6643396" y="1698745"/>
-                </a:cubicBezTo>
-              </a:path>
-            </a:pathLst>
-          </a:custGeom>
-          <a:noFill/>
-          <a:ln w="50800">
-            <a:solidFill>
-              <a:schemeClr val="accent5"/>
-            </a:solidFill>
-            <a:prstDash val="dash"/>
-            <a:headEnd type="stealth" w="lg" len="med"/>
-            <a:tailEnd type="none" w="lg" len="med"/>
-          </a:ln>
-        </p:spPr>
-        <p:style>
-          <a:lnRef idx="2">
-            <a:schemeClr val="accent1">
-              <a:shade val="50000"/>
-            </a:schemeClr>
-          </a:lnRef>
-          <a:fillRef idx="1">
-            <a:schemeClr val="accent1"/>
-          </a:fillRef>
-          <a:effectRef idx="0">
-            <a:schemeClr val="accent1"/>
-          </a:effectRef>
-          <a:fontRef idx="minor">
-            <a:schemeClr val="lt1"/>
-          </a:fontRef>
-        </p:style>
-        <p:txBody>
-          <a:bodyPr rtlCol="0" anchor="ctr"/>
-          <a:lstStyle/>
-          <a:p>
-            <a:pPr algn="ctr"/>
-            <a:endParaRPr lang="en-GB"/>
-          </a:p>
-        </p:txBody>
-      </p:sp>
-      <p:sp>
-        <p:nvSpPr>
-          <p:cNvPr id="31" name="Textfeld 30">
-            <a:extLst>
-              <a:ext uri="{FF2B5EF4-FFF2-40B4-BE49-F238E27FC236}">
-                <a16:creationId xmlns:a16="http://schemas.microsoft.com/office/drawing/2014/main" id="{1807DA9C-5862-46BA-8C1B-F481C840516C}"/>
-              </a:ext>
-            </a:extLst>
-          </p:cNvPr>
-          <p:cNvSpPr txBox="1"/>
-          <p:nvPr/>
-        </p:nvSpPr>
-        <p:spPr>
-          <a:xfrm>
-            <a:off x="4316573" y="1261881"/>
-            <a:ext cx="2178699" cy="307777"/>
-          </a:xfrm>
-          <a:prstGeom prst="rect">
-            <a:avLst/>
-          </a:prstGeom>
-          <a:noFill/>
-        </p:spPr>
-        <p:txBody>
-          <a:bodyPr wrap="square" rtlCol="0">
-            <a:spAutoFit/>
-          </a:bodyPr>
-          <a:lstStyle/>
-          <a:p>
-            <a:pPr algn="ctr"/>
-            <a:r>
-              <a:rPr lang="en-GB" sz="1400" i="1" dirty="0">
-                <a:latin typeface="Calibri (Textkörper)"/>
-                <a:cs typeface="Times New Roman" panose="02020603050405020304" pitchFamily="18" charset="0"/>
-              </a:rPr>
-              <a:t>Lookup packet (Lookup key)</a:t>
-            </a:r>
-          </a:p>
-        </p:txBody>
-      </p:sp>
-      <p:sp>
-        <p:nvSpPr>
-          <p:cNvPr id="32" name="Textfeld 31">
-            <a:extLst>
-              <a:ext uri="{FF2B5EF4-FFF2-40B4-BE49-F238E27FC236}">
-                <a16:creationId xmlns:a16="http://schemas.microsoft.com/office/drawing/2014/main" id="{C33F01CC-7B82-45EF-BC68-8AA9ABF6548D}"/>
-              </a:ext>
-            </a:extLst>
-          </p:cNvPr>
-          <p:cNvSpPr txBox="1"/>
-          <p:nvPr/>
-        </p:nvSpPr>
-        <p:spPr>
-          <a:xfrm>
-            <a:off x="3435063" y="4813043"/>
-            <a:ext cx="3941717" cy="523220"/>
-          </a:xfrm>
-          <a:prstGeom prst="rect">
-            <a:avLst/>
-          </a:prstGeom>
-          <a:noFill/>
-        </p:spPr>
-        <p:txBody>
-          <a:bodyPr wrap="square" rtlCol="0">
-            <a:spAutoFit/>
-          </a:bodyPr>
-          <a:lstStyle/>
-          <a:p>
-            <a:pPr algn="ctr"/>
-            <a:r>
-              <a:rPr lang="en-GB" sz="1400" i="1" dirty="0">
-                <a:latin typeface="Calibri (Textkörper)"/>
-                <a:cs typeface="Times New Roman" panose="02020603050405020304" pitchFamily="18" charset="0"/>
-              </a:rPr>
-              <a:t>Response (Estimated position</a:t>
-            </a:r>
-            <a:br>
-              <a:rPr lang="en-GB" sz="1400" i="1" dirty="0">
-                <a:latin typeface="Calibri (Textkörper)"/>
-                <a:cs typeface="Times New Roman" panose="02020603050405020304" pitchFamily="18" charset="0"/>
-              </a:rPr>
-            </a:br>
-            <a:r>
-              <a:rPr lang="en-GB" sz="1400" i="1" dirty="0">
-                <a:latin typeface="Calibri (Textkörper)"/>
-                <a:cs typeface="Times New Roman" panose="02020603050405020304" pitchFamily="18" charset="0"/>
-              </a:rPr>
-              <a:t>and calculated error)</a:t>
-            </a:r>
-          </a:p>
-        </p:txBody>
-      </p:sp>
-      <p:sp>
-        <p:nvSpPr>
-          <p:cNvPr id="2" name="Textfeld 1">
-            <a:extLst>
-              <a:ext uri="{FF2B5EF4-FFF2-40B4-BE49-F238E27FC236}">
-                <a16:creationId xmlns:a16="http://schemas.microsoft.com/office/drawing/2014/main" id="{EEA7B90C-8377-4097-8E1C-9F824F194D06}"/>
-              </a:ext>
-            </a:extLst>
-          </p:cNvPr>
-          <p:cNvSpPr txBox="1"/>
-          <p:nvPr/>
-        </p:nvSpPr>
-        <p:spPr>
-          <a:xfrm>
-            <a:off x="753837" y="3882560"/>
-            <a:ext cx="3941718" cy="307777"/>
-          </a:xfrm>
-          <a:prstGeom prst="rect">
-            <a:avLst/>
-          </a:prstGeom>
-          <a:noFill/>
-        </p:spPr>
-        <p:txBody>
-          <a:bodyPr wrap="square" rtlCol="0">
-            <a:spAutoFit/>
-          </a:bodyPr>
-          <a:lstStyle/>
-          <a:p>
-            <a:pPr algn="ctr"/>
-            <a:r>
-              <a:rPr lang="en-GB" sz="1400" i="1" dirty="0">
-                <a:latin typeface="Calibri (Textkörper)"/>
-                <a:cs typeface="Times New Roman" panose="02020603050405020304" pitchFamily="18" charset="0"/>
-              </a:rPr>
-              <a:t>Host performs search on narrowed response bound</a:t>
-            </a:r>
-          </a:p>
-        </p:txBody>
-      </p:sp>
+      </p:cxnSp>
     </p:spTree>
     <p:extLst>
       <p:ext uri="{BB962C8B-B14F-4D97-AF65-F5344CB8AC3E}">

</xml_diff>